<commit_message>
mc: registreer gebruiker en powerpoint voorbeeld data ingezet
</commit_message>
<xml_diff>
--- a/presentatie.pptx
+++ b/presentatie.pptx
@@ -10677,10 +10677,76 @@
               </a:rPr>
               <a:t>https://github.com/RobinMoons/soa</a:t>
             </a:r>
+            <a:endParaRPr lang="nl-BE" dirty="0"/>
+          </a:p>
+          <a:p>
+            <a:endParaRPr lang="nl-BE" dirty="0"/>
+          </a:p>
+          <a:p>
+            <a:r>
+              <a:rPr lang="nl-BE" dirty="0"/>
+              <a:t>Test gegevens:</a:t>
+            </a:r>
+          </a:p>
+          <a:p>
+            <a:pPr lvl="1"/>
+            <a:r>
+              <a:rPr lang="nl-BE" dirty="0"/>
+              <a:t>Nieuwe gebruiker aanmaken volgens procedure</a:t>
+            </a:r>
+          </a:p>
+          <a:p>
+            <a:pPr lvl="1"/>
+            <a:r>
+              <a:rPr lang="nl-BE" dirty="0" err="1"/>
+              <a:t>OpenWeatherMap</a:t>
+            </a:r>
+            <a:r>
+              <a:rPr lang="nl-BE" dirty="0"/>
+              <a:t> ID: </a:t>
+            </a:r>
+            <a:r>
+              <a:rPr lang="nl-BE" dirty="0"/>
+              <a:t>2803136</a:t>
+            </a:r>
+          </a:p>
+          <a:p>
+            <a:pPr lvl="1"/>
+            <a:r>
+              <a:rPr lang="nl-BE" dirty="0" err="1"/>
+              <a:t>EnergieService</a:t>
+            </a:r>
+            <a:r>
+              <a:rPr lang="nl-BE" dirty="0"/>
+              <a:t> ID: </a:t>
+            </a:r>
             <a:r>
               <a:rPr lang="nl-BE" dirty="0"/>
               <a:t> </a:t>
             </a:r>
+            <a:r>
+              <a:rPr lang="nl-BE" dirty="0"/>
+              <a:t>5717271485874176</a:t>
+            </a:r>
+          </a:p>
+          <a:p>
+            <a:pPr lvl="1"/>
+            <a:r>
+              <a:rPr lang="nl-BE" dirty="0"/>
+              <a:t>Stroomleverancier: Lampiris</a:t>
+            </a:r>
+          </a:p>
+          <a:p>
+            <a:pPr lvl="1"/>
+            <a:r>
+              <a:rPr lang="nl-BE" dirty="0"/>
+              <a:t>Gasleverancier</a:t>
+            </a:r>
+            <a:r>
+              <a:rPr lang="nl-BE"/>
+              <a:t>: Lampiris</a:t>
+            </a:r>
+            <a:endParaRPr lang="nl-BE" dirty="0"/>
           </a:p>
           <a:p>
             <a:endParaRPr lang="nl-BE" dirty="0"/>

</xml_diff>